<commit_message>
folders cleanup + usermanual + system docs design and refine the text
</commit_message>
<xml_diff>
--- a/documentation/user_manual.pptx
+++ b/documentation/user_manual.pptx
@@ -5,7 +5,7 @@
     <p:sldMasterId id="2147483660" r:id="rId1"/>
   </p:sldMasterIdLst>
   <p:notesMasterIdLst>
-    <p:notesMasterId r:id="rId10"/>
+    <p:notesMasterId r:id="rId11"/>
   </p:notesMasterIdLst>
   <p:sldIdLst>
     <p:sldId id="257" r:id="rId2"/>
@@ -16,6 +16,7 @@
     <p:sldId id="261" r:id="rId7"/>
     <p:sldId id="265" r:id="rId8"/>
     <p:sldId id="264" r:id="rId9"/>
+    <p:sldId id="267" r:id="rId10"/>
   </p:sldIdLst>
   <p:sldSz cx="9144000" cy="5143500" type="screen16x9"/>
   <p:notesSz cx="9144000" cy="6858000"/>
@@ -216,7 +217,7 @@
           <a:p>
             <a:fld id="{BBC68DE7-BDF4-4968-884A-7F1AE552AC52}" type="datetimeFigureOut">
               <a:rPr lang="he-IL" smtClean="0"/>
-              <a:t>כ"ט/טבת/תשפ"ה</a:t>
+              <a:t>א'/שבט/תשפ"ה</a:t>
             </a:fld>
             <a:endParaRPr lang="he-IL"/>
           </a:p>
@@ -1275,6 +1276,114 @@
 </p:notes>
 </file>
 
+<file path=ppt/notesSlides/notesSlide9.xml><?xml version="1.0" encoding="utf-8"?>
+<p:notes xmlns:a="http://schemas.openxmlformats.org/drawingml/2006/main" xmlns:r="http://schemas.openxmlformats.org/officeDocument/2006/relationships" xmlns:p="http://schemas.openxmlformats.org/presentationml/2006/main">
+  <p:cSld>
+    <p:spTree>
+      <p:nvGrpSpPr>
+        <p:cNvPr id="1" name="">
+          <a:extLst>
+            <a:ext uri="{FF2B5EF4-FFF2-40B4-BE49-F238E27FC236}">
+              <a16:creationId xmlns:a16="http://schemas.microsoft.com/office/drawing/2014/main" id="{6A208B06-577F-B54A-BCD6-B00830A74662}"/>
+            </a:ext>
+          </a:extLst>
+        </p:cNvPr>
+        <p:cNvGrpSpPr/>
+        <p:nvPr/>
+      </p:nvGrpSpPr>
+      <p:grpSpPr>
+        <a:xfrm>
+          <a:off x="0" y="0"/>
+          <a:ext cx="0" cy="0"/>
+          <a:chOff x="0" y="0"/>
+          <a:chExt cx="0" cy="0"/>
+        </a:xfrm>
+      </p:grpSpPr>
+      <p:sp>
+        <p:nvSpPr>
+          <p:cNvPr id="2" name="מציין מיקום של תמונת שקופית 1">
+            <a:extLst>
+              <a:ext uri="{FF2B5EF4-FFF2-40B4-BE49-F238E27FC236}">
+                <a16:creationId xmlns:a16="http://schemas.microsoft.com/office/drawing/2014/main" id="{BFDC9620-A628-F4F6-53D9-9CA0C844E20F}"/>
+              </a:ext>
+            </a:extLst>
+          </p:cNvPr>
+          <p:cNvSpPr>
+            <a:spLocks noGrp="1" noRot="1" noChangeAspect="1"/>
+          </p:cNvSpPr>
+          <p:nvPr>
+            <p:ph type="sldImg"/>
+          </p:nvPr>
+        </p:nvSpPr>
+        <p:spPr/>
+      </p:sp>
+      <p:sp>
+        <p:nvSpPr>
+          <p:cNvPr id="3" name="מציין מיקום של הערות 2">
+            <a:extLst>
+              <a:ext uri="{FF2B5EF4-FFF2-40B4-BE49-F238E27FC236}">
+                <a16:creationId xmlns:a16="http://schemas.microsoft.com/office/drawing/2014/main" id="{12912A35-DB50-B21E-56F7-1434BC278CB9}"/>
+              </a:ext>
+            </a:extLst>
+          </p:cNvPr>
+          <p:cNvSpPr>
+            <a:spLocks noGrp="1"/>
+          </p:cNvSpPr>
+          <p:nvPr>
+            <p:ph type="body" idx="1"/>
+          </p:nvPr>
+        </p:nvSpPr>
+        <p:spPr/>
+        <p:txBody>
+          <a:bodyPr/>
+          <a:lstStyle/>
+          <a:p>
+            <a:endParaRPr lang="he-IL"/>
+          </a:p>
+        </p:txBody>
+      </p:sp>
+      <p:sp>
+        <p:nvSpPr>
+          <p:cNvPr id="4" name="מציין מיקום של מספר שקופית 3">
+            <a:extLst>
+              <a:ext uri="{FF2B5EF4-FFF2-40B4-BE49-F238E27FC236}">
+                <a16:creationId xmlns:a16="http://schemas.microsoft.com/office/drawing/2014/main" id="{C34778F3-BA70-195E-6737-FFFEE6E6F3CC}"/>
+              </a:ext>
+            </a:extLst>
+          </p:cNvPr>
+          <p:cNvSpPr>
+            <a:spLocks noGrp="1"/>
+          </p:cNvSpPr>
+          <p:nvPr>
+            <p:ph type="sldNum" sz="quarter" idx="5"/>
+          </p:nvPr>
+        </p:nvSpPr>
+        <p:spPr/>
+        <p:txBody>
+          <a:bodyPr/>
+          <a:lstStyle/>
+          <a:p>
+            <a:fld id="{42EBCB4B-3C1C-4D15-8806-951B361F2CCE}" type="slidenum">
+              <a:rPr lang="he-IL" smtClean="0"/>
+              <a:t>9</a:t>
+            </a:fld>
+            <a:endParaRPr lang="he-IL"/>
+          </a:p>
+        </p:txBody>
+      </p:sp>
+    </p:spTree>
+    <p:extLst>
+      <p:ext uri="{BB962C8B-B14F-4D97-AF65-F5344CB8AC3E}">
+        <p14:creationId xmlns:p14="http://schemas.microsoft.com/office/powerpoint/2010/main" val="3143311201"/>
+      </p:ext>
+    </p:extLst>
+  </p:cSld>
+  <p:clrMapOvr>
+    <a:masterClrMapping/>
+  </p:clrMapOvr>
+</p:notes>
+</file>
+
 <file path=ppt/slideLayouts/slideLayout1.xml><?xml version="1.0" encoding="utf-8"?>
 <p:sldLayout xmlns:a="http://schemas.openxmlformats.org/drawingml/2006/main" xmlns:r="http://schemas.openxmlformats.org/officeDocument/2006/relationships" xmlns:p="http://schemas.openxmlformats.org/presentationml/2006/main" type="title" preserve="1">
   <p:cSld name="שקופית כותרת">
@@ -1406,7 +1515,7 @@
           <a:p>
             <a:fld id="{A05FCE8D-BEC0-4FB0-B4E4-C13D2CD9A77F}" type="datetimeFigureOut">
               <a:rPr lang="he-IL" smtClean="0"/>
-              <a:t>כ"ט/טבת/תשפ"ה</a:t>
+              <a:t>א'/שבט/תשפ"ה</a:t>
             </a:fld>
             <a:endParaRPr lang="he-IL"/>
           </a:p>
@@ -1576,7 +1685,7 @@
           <a:p>
             <a:fld id="{A05FCE8D-BEC0-4FB0-B4E4-C13D2CD9A77F}" type="datetimeFigureOut">
               <a:rPr lang="he-IL" smtClean="0"/>
-              <a:t>כ"ט/טבת/תשפ"ה</a:t>
+              <a:t>א'/שבט/תשפ"ה</a:t>
             </a:fld>
             <a:endParaRPr lang="he-IL"/>
           </a:p>
@@ -1756,7 +1865,7 @@
           <a:p>
             <a:fld id="{A05FCE8D-BEC0-4FB0-B4E4-C13D2CD9A77F}" type="datetimeFigureOut">
               <a:rPr lang="he-IL" smtClean="0"/>
-              <a:t>כ"ט/טבת/תשפ"ה</a:t>
+              <a:t>א'/שבט/תשפ"ה</a:t>
             </a:fld>
             <a:endParaRPr lang="he-IL"/>
           </a:p>
@@ -1926,7 +2035,7 @@
           <a:p>
             <a:fld id="{A05FCE8D-BEC0-4FB0-B4E4-C13D2CD9A77F}" type="datetimeFigureOut">
               <a:rPr lang="he-IL" smtClean="0"/>
-              <a:t>כ"ט/טבת/תשפ"ה</a:t>
+              <a:t>א'/שבט/תשפ"ה</a:t>
             </a:fld>
             <a:endParaRPr lang="he-IL"/>
           </a:p>
@@ -2172,7 +2281,7 @@
           <a:p>
             <a:fld id="{A05FCE8D-BEC0-4FB0-B4E4-C13D2CD9A77F}" type="datetimeFigureOut">
               <a:rPr lang="he-IL" smtClean="0"/>
-              <a:t>כ"ט/טבת/תשפ"ה</a:t>
+              <a:t>א'/שבט/תשפ"ה</a:t>
             </a:fld>
             <a:endParaRPr lang="he-IL"/>
           </a:p>
@@ -2404,7 +2513,7 @@
           <a:p>
             <a:fld id="{A05FCE8D-BEC0-4FB0-B4E4-C13D2CD9A77F}" type="datetimeFigureOut">
               <a:rPr lang="he-IL" smtClean="0"/>
-              <a:t>כ"ט/טבת/תשפ"ה</a:t>
+              <a:t>א'/שבט/תשפ"ה</a:t>
             </a:fld>
             <a:endParaRPr lang="he-IL"/>
           </a:p>
@@ -2771,7 +2880,7 @@
           <a:p>
             <a:fld id="{A05FCE8D-BEC0-4FB0-B4E4-C13D2CD9A77F}" type="datetimeFigureOut">
               <a:rPr lang="he-IL" smtClean="0"/>
-              <a:t>כ"ט/טבת/תשפ"ה</a:t>
+              <a:t>א'/שבט/תשפ"ה</a:t>
             </a:fld>
             <a:endParaRPr lang="he-IL"/>
           </a:p>
@@ -2889,7 +2998,7 @@
           <a:p>
             <a:fld id="{A05FCE8D-BEC0-4FB0-B4E4-C13D2CD9A77F}" type="datetimeFigureOut">
               <a:rPr lang="he-IL" smtClean="0"/>
-              <a:t>כ"ט/טבת/תשפ"ה</a:t>
+              <a:t>א'/שבט/תשפ"ה</a:t>
             </a:fld>
             <a:endParaRPr lang="he-IL"/>
           </a:p>
@@ -2984,7 +3093,7 @@
           <a:p>
             <a:fld id="{A05FCE8D-BEC0-4FB0-B4E4-C13D2CD9A77F}" type="datetimeFigureOut">
               <a:rPr lang="he-IL" smtClean="0"/>
-              <a:t>כ"ט/טבת/תשפ"ה</a:t>
+              <a:t>א'/שבט/תשפ"ה</a:t>
             </a:fld>
             <a:endParaRPr lang="he-IL"/>
           </a:p>
@@ -3261,7 +3370,7 @@
           <a:p>
             <a:fld id="{A05FCE8D-BEC0-4FB0-B4E4-C13D2CD9A77F}" type="datetimeFigureOut">
               <a:rPr lang="he-IL" smtClean="0"/>
-              <a:t>כ"ט/טבת/תשפ"ה</a:t>
+              <a:t>א'/שבט/תשפ"ה</a:t>
             </a:fld>
             <a:endParaRPr lang="he-IL"/>
           </a:p>
@@ -3518,7 +3627,7 @@
           <a:p>
             <a:fld id="{A05FCE8D-BEC0-4FB0-B4E4-C13D2CD9A77F}" type="datetimeFigureOut">
               <a:rPr lang="he-IL" smtClean="0"/>
-              <a:t>כ"ט/טבת/תשפ"ה</a:t>
+              <a:t>א'/שבט/תשפ"ה</a:t>
             </a:fld>
             <a:endParaRPr lang="he-IL"/>
           </a:p>
@@ -3731,7 +3840,7 @@
           <a:p>
             <a:fld id="{A05FCE8D-BEC0-4FB0-B4E4-C13D2CD9A77F}" type="datetimeFigureOut">
               <a:rPr lang="he-IL" smtClean="0"/>
-              <a:t>כ"ט/טבת/תשפ"ה</a:t>
+              <a:t>א'/שבט/תשפ"ה</a:t>
             </a:fld>
             <a:endParaRPr lang="he-IL"/>
           </a:p>
@@ -4673,6 +4782,61 @@
           </p:txBody>
         </p:sp>
       </p:grpSp>
+      <p:sp>
+        <p:nvSpPr>
+          <p:cNvPr id="6" name="תיבת טקסט 5">
+            <a:extLst>
+              <a:ext uri="{FF2B5EF4-FFF2-40B4-BE49-F238E27FC236}">
+                <a16:creationId xmlns:a16="http://schemas.microsoft.com/office/drawing/2014/main" id="{0DCBC0FA-3F5E-02D3-3A24-B56119C79D2F}"/>
+              </a:ext>
+            </a:extLst>
+          </p:cNvPr>
+          <p:cNvSpPr txBox="1"/>
+          <p:nvPr/>
+        </p:nvSpPr>
+        <p:spPr>
+          <a:xfrm>
+            <a:off x="3672000" y="186079"/>
+            <a:ext cx="1800000" cy="374571"/>
+          </a:xfrm>
+          <a:prstGeom prst="roundRect">
+            <a:avLst/>
+          </a:prstGeom>
+          <a:solidFill>
+            <a:schemeClr val="accent3">
+              <a:lumMod val="75000"/>
+            </a:schemeClr>
+          </a:solidFill>
+        </p:spPr>
+        <p:txBody>
+          <a:bodyPr wrap="square" rtlCol="1">
+            <a:spAutoFit/>
+          </a:bodyPr>
+          <a:lstStyle/>
+          <a:p>
+            <a:pPr algn="ctr"/>
+            <a:r>
+              <a:rPr lang="en-US" sz="1600" dirty="0">
+                <a:solidFill>
+                  <a:schemeClr val="accent1">
+                    <a:lumMod val="50000"/>
+                  </a:schemeClr>
+                </a:solidFill>
+                <a:latin typeface="Bahnschrift SemiBold" panose="020B0502040204020203" pitchFamily="34" charset="0"/>
+              </a:rPr>
+              <a:t>USER MANUAL</a:t>
+            </a:r>
+            <a:endParaRPr lang="he-IL" sz="1600" dirty="0">
+              <a:solidFill>
+                <a:schemeClr val="accent1">
+                  <a:lumMod val="50000"/>
+                </a:schemeClr>
+              </a:solidFill>
+              <a:latin typeface="Bahnschrift SemiBold" panose="020B0502040204020203" pitchFamily="34" charset="0"/>
+            </a:endParaRPr>
+          </a:p>
+        </p:txBody>
+      </p:sp>
     </p:spTree>
     <p:extLst>
       <p:ext uri="{BB962C8B-B14F-4D97-AF65-F5344CB8AC3E}">
@@ -4733,8 +4897,8 @@
         </p:nvSpPr>
         <p:spPr>
           <a:xfrm>
-            <a:off x="543998" y="871537"/>
-            <a:ext cx="8099429" cy="4013283"/>
+            <a:off x="189286" y="871537"/>
+            <a:ext cx="8765429" cy="4013283"/>
           </a:xfrm>
           <a:prstGeom prst="rect">
             <a:avLst/>
@@ -4764,7 +4928,101 @@
           <a:bodyPr rtlCol="1" anchor="t"/>
           <a:lstStyle/>
           <a:p>
-            <a:pPr algn="just"/>
+            <a:pPr>
+              <a:spcBef>
+                <a:spcPts val="600"/>
+              </a:spcBef>
+            </a:pPr>
+            <a:r>
+              <a:rPr lang="en-US" sz="1600" dirty="0">
+                <a:solidFill>
+                  <a:srgbClr val="FDCB95"/>
+                </a:solidFill>
+                <a:latin typeface="Bahnschrift SemiCondensed" panose="020B0502040204020203" pitchFamily="34" charset="0"/>
+              </a:rPr>
+              <a:t>LOLMovies.com </a:t>
+            </a:r>
+            <a:r>
+              <a:rPr lang="en-US" sz="1400" dirty="0">
+                <a:solidFill>
+                  <a:schemeClr val="accent4">
+                    <a:lumMod val="40000"/>
+                    <a:lumOff val="60000"/>
+                  </a:schemeClr>
+                </a:solidFill>
+                <a:latin typeface="Bahnschrift Light SemiCondensed" panose="020B0502040204020203" pitchFamily="34" charset="0"/>
+              </a:rPr>
+              <a:t>is a web application designed to make the world’s best comedy movies easily accessible to anyone looking for a good laugh. </a:t>
+            </a:r>
+          </a:p>
+          <a:p>
+            <a:pPr>
+              <a:spcBef>
+                <a:spcPts val="600"/>
+              </a:spcBef>
+            </a:pPr>
+            <a:r>
+              <a:rPr lang="en-US" sz="1400" dirty="0">
+                <a:solidFill>
+                  <a:schemeClr val="accent4">
+                    <a:lumMod val="40000"/>
+                    <a:lumOff val="60000"/>
+                  </a:schemeClr>
+                </a:solidFill>
+                <a:latin typeface="Bahnschrift Light SemiCondensed" panose="020B0502040204020203" pitchFamily="34" charset="0"/>
+              </a:rPr>
+              <a:t>In times of uncertainty, when many of us are facing the challenges of war and Miluim,</a:t>
+            </a:r>
+            <a:r>
+              <a:rPr lang="en-US" sz="1400" b="1" dirty="0">
+                <a:solidFill>
+                  <a:schemeClr val="accent4">
+                    <a:lumMod val="40000"/>
+                    <a:lumOff val="60000"/>
+                  </a:schemeClr>
+                </a:solidFill>
+                <a:latin typeface="Bahnschrift Light SemiCondensed" panose="020B0502040204020203" pitchFamily="34" charset="0"/>
+              </a:rPr>
+              <a:t> </a:t>
+            </a:r>
+            <a:r>
+              <a:rPr lang="en-US" sz="1400" dirty="0">
+                <a:solidFill>
+                  <a:schemeClr val="accent4">
+                    <a:lumMod val="40000"/>
+                    <a:lumOff val="60000"/>
+                  </a:schemeClr>
+                </a:solidFill>
+                <a:latin typeface="Bahnschrift Light SemiCondensed" panose="020B0502040204020203" pitchFamily="34" charset="0"/>
+              </a:rPr>
+              <a:t>we believe that laughter is more important than ever — it provides a much-needed escape and a moment of relief.</a:t>
+            </a:r>
+          </a:p>
+          <a:p>
+            <a:pPr>
+              <a:spcBef>
+                <a:spcPts val="600"/>
+              </a:spcBef>
+            </a:pPr>
+            <a:r>
+              <a:rPr lang="en-US" sz="1400" dirty="0">
+                <a:solidFill>
+                  <a:schemeClr val="accent4">
+                    <a:lumMod val="40000"/>
+                    <a:lumOff val="60000"/>
+                  </a:schemeClr>
+                </a:solidFill>
+                <a:latin typeface="Bahnschrift Light SemiCondensed" panose="020B0502040204020203" pitchFamily="34" charset="0"/>
+              </a:rPr>
+              <a:t>The application provides access to detailed information about the top 1,000 highest-rated, full-length comedy movies of all time in the U.S. (English-language), sorted by popularity in descending order.</a:t>
+            </a:r>
+          </a:p>
+          <a:p>
+            <a:pPr>
+              <a:spcBef>
+                <a:spcPts val="600"/>
+              </a:spcBef>
+            </a:pPr>
             <a:r>
               <a:rPr lang="en-US" sz="1600" dirty="0">
                 <a:solidFill>
@@ -4773,140 +5031,113 @@
                     <a:lumOff val="60000"/>
                   </a:schemeClr>
                 </a:solidFill>
-                <a:latin typeface="Bahnschrift Light" panose="020B0502040204020203" pitchFamily="34" charset="0"/>
+                <a:latin typeface="Bahnschrift SemiCondensed" panose="020B0502040204020203" pitchFamily="34" charset="0"/>
               </a:rPr>
-              <a:t>The application is designed to make comedy movies available to anyone who wants them. </a:t>
+              <a:t>Key Features:</a:t>
             </a:r>
           </a:p>
           <a:p>
-            <a:pPr algn="just"/>
+            <a:pPr>
+              <a:spcBef>
+                <a:spcPts val="600"/>
+              </a:spcBef>
+              <a:buFont typeface="Arial" panose="020B0604020202020204" pitchFamily="34" charset="0"/>
+              <a:buChar char="•"/>
+            </a:pPr>
             <a:r>
-              <a:rPr lang="en-US" sz="1600" dirty="0">
+              <a:rPr lang="en-US" sz="1400" dirty="0">
                 <a:solidFill>
                   <a:schemeClr val="accent4">
                     <a:lumMod val="40000"/>
                     <a:lumOff val="60000"/>
                   </a:schemeClr>
                 </a:solidFill>
-                <a:latin typeface="Bahnschrift Light" panose="020B0502040204020203" pitchFamily="34" charset="0"/>
+                <a:latin typeface="Bahnschrift Light SemiCondensed" panose="020B0502040204020203" pitchFamily="34" charset="0"/>
               </a:rPr>
-              <a:t>Precisely in the recent period that is accompanied by stress and anxiety, we wanted to add laughter and joy. </a:t>
+              <a:t> Advanced Search: Find movies by keywords or by searching for words that appear in the title or overview.</a:t>
             </a:r>
           </a:p>
           <a:p>
-            <a:pPr algn="just"/>
+            <a:pPr>
+              <a:spcBef>
+                <a:spcPts val="600"/>
+              </a:spcBef>
+              <a:buFont typeface="Arial" panose="020B0604020202020204" pitchFamily="34" charset="0"/>
+              <a:buChar char="•"/>
+            </a:pPr>
             <a:r>
-              <a:rPr lang="en-US" sz="1600" dirty="0">
+              <a:rPr lang="en-US" sz="1400" dirty="0">
                 <a:solidFill>
                   <a:schemeClr val="accent4">
                     <a:lumMod val="40000"/>
                     <a:lumOff val="60000"/>
                   </a:schemeClr>
                 </a:solidFill>
-                <a:latin typeface="Bahnschrift Light" panose="020B0502040204020203" pitchFamily="34" charset="0"/>
+                <a:latin typeface="Bahnschrift Light SemiCondensed" panose="020B0502040204020203" pitchFamily="34" charset="0"/>
               </a:rPr>
-              <a:t>In the application you can search for information about the 1000 top-rated full-length comedy movies of all times in the US, English Language, sorted by popularity (DESC).</a:t>
+              <a:t> Actor &amp; Director Insights: Explore a director’s favorite collaborators, or find the top 10 actors who starred in the most films within a specific subgenre and decade.</a:t>
             </a:r>
           </a:p>
           <a:p>
-            <a:endParaRPr lang="en-US" sz="1600" dirty="0">
-              <a:solidFill>
-                <a:schemeClr val="accent4">
-                  <a:lumMod val="40000"/>
-                  <a:lumOff val="60000"/>
-                </a:schemeClr>
-              </a:solidFill>
-              <a:latin typeface="Bahnschrift Light" panose="020B0502040204020203" pitchFamily="34" charset="0"/>
-            </a:endParaRPr>
-          </a:p>
-          <a:p>
+            <a:pPr>
+              <a:spcBef>
+                <a:spcPts val="600"/>
+              </a:spcBef>
+              <a:buFont typeface="Arial" panose="020B0604020202020204" pitchFamily="34" charset="0"/>
+              <a:buChar char="•"/>
+            </a:pPr>
             <a:r>
-              <a:rPr lang="en-US" sz="1600" dirty="0">
+              <a:rPr lang="en-US" sz="1400" dirty="0">
                 <a:solidFill>
                   <a:schemeClr val="accent4">
                     <a:lumMod val="40000"/>
                     <a:lumOff val="60000"/>
                   </a:schemeClr>
                 </a:solidFill>
-                <a:latin typeface="Bahnschrift Light" panose="020B0502040204020203" pitchFamily="34" charset="0"/>
+                <a:latin typeface="Bahnschrift Light SemiCondensed" panose="020B0502040204020203" pitchFamily="34" charset="0"/>
               </a:rPr>
-              <a:t>Specifically, the application supports searching for words appearing in the title or overview of a movie and searching for movies by keyword.</a:t>
+              <a:t> Hidden Gems: For cinephiles seeking originality, this feature highlights underrated yet highly rated movies from a given year.</a:t>
             </a:r>
           </a:p>
           <a:p>
+            <a:pPr>
+              <a:spcBef>
+                <a:spcPts val="600"/>
+              </a:spcBef>
+              <a:buFont typeface="Arial" panose="020B0604020202020204" pitchFamily="34" charset="0"/>
+              <a:buChar char="•"/>
+            </a:pPr>
             <a:r>
-              <a:rPr lang="en-US" sz="1600" dirty="0">
+              <a:rPr lang="en-US" sz="1400" dirty="0">
                 <a:solidFill>
                   <a:schemeClr val="accent4">
                     <a:lumMod val="40000"/>
                     <a:lumOff val="60000"/>
                   </a:schemeClr>
                 </a:solidFill>
-                <a:latin typeface="Bahnschrift Light" panose="020B0502040204020203" pitchFamily="34" charset="0"/>
+                <a:latin typeface="Bahnschrift Light SemiCondensed" panose="020B0502040204020203" pitchFamily="34" charset="0"/>
               </a:rPr>
-              <a:t>In addition, it is possible to find the favorite actors of a certain director and the 10 actors who played in the most films in a certain subgenre and in a certain decade.</a:t>
+              <a:t> Popular Picks: Search for a director or actor's most popular movies or explore the most popular genres of a specific actor.</a:t>
             </a:r>
-            <a:endParaRPr lang="he-IL" sz="1600" dirty="0">
-              <a:solidFill>
-                <a:schemeClr val="accent4">
-                  <a:lumMod val="40000"/>
-                  <a:lumOff val="60000"/>
-                </a:schemeClr>
-              </a:solidFill>
-              <a:latin typeface="Bahnschrift Light" panose="020B0502040204020203" pitchFamily="34" charset="0"/>
-            </a:endParaRPr>
-          </a:p>
-          <a:p>
-            <a:pPr algn="just"/>
+          </a:p>
+          <a:p>
+            <a:pPr>
+              <a:spcBef>
+                <a:spcPts val="600"/>
+              </a:spcBef>
+            </a:pPr>
             <a:r>
-              <a:rPr lang="en-US" sz="1600" dirty="0">
+              <a:rPr lang="en-US" sz="1400" dirty="0">
                 <a:solidFill>
                   <a:schemeClr val="accent4">
                     <a:lumMod val="40000"/>
                     <a:lumOff val="60000"/>
                   </a:schemeClr>
                 </a:solidFill>
-                <a:latin typeface="Bahnschrift Light" panose="020B0502040204020203" pitchFamily="34" charset="0"/>
+                <a:latin typeface="Bahnschrift Light SemiCondensed" panose="020B0502040204020203" pitchFamily="34" charset="0"/>
               </a:rPr>
-              <a:t>Advanced people who want to watch an interesting and original movie find interest in the search "Hidden Gems" - unpopular but highly rated movies for a given year, </a:t>
+              <a:t>Our application is designed for both casual viewers and dedicated movie enthusiasts, ensuring that everyone can find the perfect comedy to bring a smile, even in difficult times.</a:t>
             </a:r>
-          </a:p>
-          <a:p>
-            <a:r>
-              <a:rPr lang="en-US" sz="1600" dirty="0">
-                <a:solidFill>
-                  <a:schemeClr val="accent4">
-                    <a:lumMod val="40000"/>
-                    <a:lumOff val="60000"/>
-                  </a:schemeClr>
-                </a:solidFill>
-                <a:latin typeface="Bahnschrift Light" panose="020B0502040204020203" pitchFamily="34" charset="0"/>
-              </a:rPr>
-              <a:t>search for the most popular movies of a director or actor, </a:t>
-            </a:r>
-          </a:p>
-          <a:p>
-            <a:r>
-              <a:rPr lang="en-US" sz="1600" dirty="0">
-                <a:solidFill>
-                  <a:schemeClr val="accent4">
-                    <a:lumMod val="40000"/>
-                    <a:lumOff val="60000"/>
-                  </a:schemeClr>
-                </a:solidFill>
-                <a:latin typeface="Bahnschrift Light" panose="020B0502040204020203" pitchFamily="34" charset="0"/>
-              </a:rPr>
-              <a:t>and find the most popular genres of a certain player.</a:t>
-            </a:r>
-            <a:endParaRPr lang="en-US" sz="1600" dirty="0">
-              <a:solidFill>
-                <a:schemeClr val="accent4">
-                  <a:lumMod val="40000"/>
-                  <a:lumOff val="60000"/>
-                </a:schemeClr>
-              </a:solidFill>
-              <a:latin typeface="Bahnschrift Light" panose="020B0502040204020203" pitchFamily="34" charset="0"/>
-            </a:endParaRPr>
           </a:p>
         </p:txBody>
       </p:sp>
@@ -7735,7 +7966,7 @@
                   </a:solidFill>
                   <a:latin typeface="Zing Rust Demo Base" panose="00000500000000000000" pitchFamily="50" charset="0"/>
                 </a:rPr>
-                <a:t>.com                                  				           </a:t>
+                <a:t>.com                                  				  </a:t>
               </a:r>
               <a:r>
                 <a:rPr lang="en-US" sz="1400" b="1" dirty="0">
@@ -7757,7 +7988,7 @@
                   </a:solidFill>
                   <a:latin typeface="Bahnschrift SemiBold" panose="020B0502040204020203" pitchFamily="34" charset="0"/>
                 </a:rPr>
-                <a:t>Director's favorite actors</a:t>
+                <a:t>Director's favorite collaborators</a:t>
               </a:r>
             </a:p>
           </p:txBody>
@@ -9588,6 +9819,165 @@
     <p:extLst>
       <p:ext uri="{BB962C8B-B14F-4D97-AF65-F5344CB8AC3E}">
         <p14:creationId xmlns:p14="http://schemas.microsoft.com/office/powerpoint/2010/main" val="4260840207"/>
+      </p:ext>
+    </p:extLst>
+  </p:cSld>
+  <p:clrMapOvr>
+    <a:masterClrMapping/>
+  </p:clrMapOvr>
+</p:sld>
+</file>
+
+<file path=ppt/slides/slide9.xml><?xml version="1.0" encoding="utf-8"?>
+<p:sld xmlns:a="http://schemas.openxmlformats.org/drawingml/2006/main" xmlns:r="http://schemas.openxmlformats.org/officeDocument/2006/relationships" xmlns:p="http://schemas.openxmlformats.org/presentationml/2006/main">
+  <p:cSld>
+    <p:bg>
+      <p:bgPr>
+        <a:solidFill>
+          <a:schemeClr val="accent1">
+            <a:lumMod val="50000"/>
+          </a:schemeClr>
+        </a:solidFill>
+        <a:effectLst/>
+      </p:bgPr>
+    </p:bg>
+    <p:spTree>
+      <p:nvGrpSpPr>
+        <p:cNvPr id="1" name="">
+          <a:extLst>
+            <a:ext uri="{FF2B5EF4-FFF2-40B4-BE49-F238E27FC236}">
+              <a16:creationId xmlns:a16="http://schemas.microsoft.com/office/drawing/2014/main" id="{09D7A374-DB79-0358-AF45-F5B3992D34F2}"/>
+            </a:ext>
+          </a:extLst>
+        </p:cNvPr>
+        <p:cNvGrpSpPr/>
+        <p:nvPr/>
+      </p:nvGrpSpPr>
+      <p:grpSpPr>
+        <a:xfrm>
+          <a:off x="0" y="0"/>
+          <a:ext cx="0" cy="0"/>
+          <a:chOff x="0" y="0"/>
+          <a:chExt cx="0" cy="0"/>
+        </a:xfrm>
+      </p:grpSpPr>
+      <p:grpSp>
+        <p:nvGrpSpPr>
+          <p:cNvPr id="19" name="קבוצה 18">
+            <a:extLst>
+              <a:ext uri="{FF2B5EF4-FFF2-40B4-BE49-F238E27FC236}">
+                <a16:creationId xmlns:a16="http://schemas.microsoft.com/office/drawing/2014/main" id="{DB337E8D-48FA-3909-2AC3-13B8F4C1726E}"/>
+              </a:ext>
+            </a:extLst>
+          </p:cNvPr>
+          <p:cNvGrpSpPr/>
+          <p:nvPr/>
+        </p:nvGrpSpPr>
+        <p:grpSpPr>
+          <a:xfrm>
+            <a:off x="3460502" y="1288729"/>
+            <a:ext cx="2222997" cy="2566043"/>
+            <a:chOff x="534491" y="1303016"/>
+            <a:chExt cx="2222997" cy="2566043"/>
+          </a:xfrm>
+        </p:grpSpPr>
+        <p:sp>
+          <p:nvSpPr>
+            <p:cNvPr id="23" name="אליפסה 22">
+              <a:extLst>
+                <a:ext uri="{FF2B5EF4-FFF2-40B4-BE49-F238E27FC236}">
+                  <a16:creationId xmlns:a16="http://schemas.microsoft.com/office/drawing/2014/main" id="{ACEDC1A4-0769-4CE9-202B-C435ECCC9505}"/>
+                </a:ext>
+              </a:extLst>
+            </p:cNvPr>
+            <p:cNvSpPr/>
+            <p:nvPr/>
+          </p:nvSpPr>
+          <p:spPr>
+            <a:xfrm>
+              <a:off x="650079" y="3432780"/>
+              <a:ext cx="2065321" cy="436279"/>
+            </a:xfrm>
+            <a:prstGeom prst="ellipse">
+              <a:avLst/>
+            </a:prstGeom>
+            <a:solidFill>
+              <a:schemeClr val="accent2">
+                <a:lumMod val="75000"/>
+              </a:schemeClr>
+            </a:solidFill>
+            <a:ln>
+              <a:noFill/>
+            </a:ln>
+            <a:effectLst>
+              <a:softEdge rad="127000"/>
+            </a:effectLst>
+          </p:spPr>
+          <p:style>
+            <a:lnRef idx="2">
+              <a:schemeClr val="accent1">
+                <a:shade val="15000"/>
+              </a:schemeClr>
+            </a:lnRef>
+            <a:fillRef idx="1">
+              <a:schemeClr val="accent1"/>
+            </a:fillRef>
+            <a:effectRef idx="0">
+              <a:schemeClr val="accent1"/>
+            </a:effectRef>
+            <a:fontRef idx="minor">
+              <a:schemeClr val="lt1"/>
+            </a:fontRef>
+          </p:style>
+          <p:txBody>
+            <a:bodyPr rtlCol="1" anchor="ctr"/>
+            <a:lstStyle/>
+            <a:p>
+              <a:pPr algn="ctr"/>
+              <a:endParaRPr lang="he-IL"/>
+            </a:p>
+          </p:txBody>
+        </p:sp>
+        <p:pic>
+          <p:nvPicPr>
+            <p:cNvPr id="24" name="תמונה 23">
+              <a:extLst>
+                <a:ext uri="{FF2B5EF4-FFF2-40B4-BE49-F238E27FC236}">
+                  <a16:creationId xmlns:a16="http://schemas.microsoft.com/office/drawing/2014/main" id="{CF264932-6396-BFB9-A133-7ED84DC7A756}"/>
+                </a:ext>
+              </a:extLst>
+            </p:cNvPr>
+            <p:cNvPicPr>
+              <a:picLocks noChangeAspect="1"/>
+            </p:cNvPicPr>
+            <p:nvPr/>
+          </p:nvPicPr>
+          <p:blipFill>
+            <a:blip r:embed="rId3" cstate="hqprint">
+              <a:extLst>
+                <a:ext uri="{28A0092B-C50C-407E-A947-70E740481C1C}">
+                  <a14:useLocalDpi xmlns:a14="http://schemas.microsoft.com/office/drawing/2010/main" val="0"/>
+                </a:ext>
+              </a:extLst>
+            </a:blip>
+            <a:srcRect l="6197" r="6197"/>
+            <a:stretch/>
+          </p:blipFill>
+          <p:spPr>
+            <a:xfrm>
+              <a:off x="534491" y="1303016"/>
+              <a:ext cx="2222997" cy="2537468"/>
+            </a:xfrm>
+            <a:prstGeom prst="rect">
+              <a:avLst/>
+            </a:prstGeom>
+          </p:spPr>
+        </p:pic>
+      </p:grpSp>
+    </p:spTree>
+    <p:extLst>
+      <p:ext uri="{BB962C8B-B14F-4D97-AF65-F5344CB8AC3E}">
+        <p14:creationId xmlns:p14="http://schemas.microsoft.com/office/powerpoint/2010/main" val="3246324085"/>
       </p:ext>
     </p:extLst>
   </p:cSld>

</xml_diff>